<commit_message>
Bugs and broken links
</commit_message>
<xml_diff>
--- a/assets/files/content-strategy/content-strategy-template.pptx
+++ b/assets/files/content-strategy/content-strategy-template.pptx
@@ -27,7 +27,7 @@
   <p:notesSz cx="6858000" cy="9144000"/>
   <p:embeddedFontLst>
     <p:embeddedFont>
-      <p:font typeface="Montserrat"/>
+      <p:font typeface="Montserrat" pitchFamily="2" charset="77"/>
       <p:regular r:id="rId17"/>
       <p:bold r:id="rId18"/>
       <p:italic r:id="rId19"/>
@@ -270,6 +270,11 @@
       </a:defRPr>
     </a:lvl9pPr>
   </p:defaultTextStyle>
+  <p:extLst>
+    <p:ext uri="{EFAFB233-063F-42B5-8137-9DF3F51BA10A}">
+      <p15:sldGuideLst xmlns:p15="http://schemas.microsoft.com/office/powerpoint/2012/main"/>
+    </p:ext>
+  </p:extLst>
 </p:presentation>
 </file>
 
@@ -1984,7 +1989,7 @@
               </a:spcAft>
               <a:buNone/>
             </a:pPr>
-            <a:endParaRPr/>
+            <a:endParaRPr dirty="0"/>
           </a:p>
         </p:txBody>
       </p:sp>
@@ -21018,10 +21023,10 @@
               <a:buNone/>
             </a:pPr>
             <a:r>
-              <a:rPr lang="en" sz="7000"/>
+              <a:rPr lang="en" sz="7000" dirty="0"/>
               <a:t>8. Next steps</a:t>
             </a:r>
-            <a:endParaRPr sz="7000"/>
+            <a:endParaRPr sz="7000" dirty="0"/>
           </a:p>
           <a:p>
             <a:pPr marL="0" lvl="0" indent="0" rtl="0">
@@ -21033,7 +21038,7 @@
               </a:spcAft>
               <a:buNone/>
             </a:pPr>
-            <a:endParaRPr sz="7000"/>
+            <a:endParaRPr sz="7000" dirty="0"/>
           </a:p>
           <a:p>
             <a:pPr marL="0" lvl="0" indent="0" rtl="0">
@@ -21046,11 +21051,11 @@
               <a:buNone/>
             </a:pPr>
             <a:r>
-              <a:rPr lang="en" sz="3000" b="0"/>
+              <a:rPr lang="en" sz="3000" b="0" dirty="0"/>
               <a:t>This is just the first part of your content strategy. </a:t>
             </a:r>
             <a:r>
-              <a:rPr lang="en" sz="3000" b="0" u="sng">
+              <a:rPr lang="en" sz="3000" b="0" u="sng" dirty="0">
                 <a:solidFill>
                   <a:schemeClr val="hlink"/>
                 </a:solidFill>
@@ -21059,10 +21064,10 @@
               <a:t>Digital Guides</a:t>
             </a:r>
             <a:r>
-              <a:rPr lang="en" sz="3000" b="0"/>
+              <a:rPr lang="en" sz="3000" b="0" dirty="0"/>
               <a:t> will be updating with further guidance on more strategy and content structure topics. </a:t>
             </a:r>
-            <a:endParaRPr sz="3000" b="0"/>
+            <a:endParaRPr sz="3000" b="0" dirty="0"/>
           </a:p>
           <a:p>
             <a:pPr marL="0" lvl="0" indent="0" rtl="0">
@@ -21074,7 +21079,7 @@
               </a:spcAft>
               <a:buNone/>
             </a:pPr>
-            <a:endParaRPr sz="3000" b="0"/>
+            <a:endParaRPr sz="3000" b="0" dirty="0"/>
           </a:p>
           <a:p>
             <a:pPr marL="0" lvl="0" indent="0" rtl="0">
@@ -21087,10 +21092,10 @@
               <a:buNone/>
             </a:pPr>
             <a:r>
-              <a:rPr lang="en" sz="3000" b="0"/>
+              <a:rPr lang="en" sz="3000" b="0" dirty="0"/>
               <a:t>You should continue to use this document and update it with all your findings.  </a:t>
             </a:r>
-            <a:endParaRPr sz="3000" b="0"/>
+            <a:endParaRPr sz="3000" b="0" dirty="0"/>
           </a:p>
           <a:p>
             <a:pPr marL="0" lvl="0" indent="0" rtl="0">
@@ -21102,7 +21107,7 @@
               </a:spcAft>
               <a:buNone/>
             </a:pPr>
-            <a:endParaRPr sz="3000" b="0"/>
+            <a:endParaRPr sz="3000" b="0" dirty="0"/>
           </a:p>
           <a:p>
             <a:pPr marL="0" lvl="0" indent="0" rtl="0">
@@ -21114,7 +21119,7 @@
               </a:spcAft>
               <a:buNone/>
             </a:pPr>
-            <a:endParaRPr sz="3000" b="0"/>
+            <a:endParaRPr sz="3000" b="0" dirty="0"/>
           </a:p>
         </p:txBody>
       </p:sp>
@@ -23449,8 +23454,14 @@
               <a:t>Audit content</a:t>
             </a:r>
             <a:r>
+              <a:rPr lang="en" sz="3000" b="0" dirty="0">
+                <a:hlinkClick r:id="rId3"/>
+              </a:rPr>
+              <a:t> </a:t>
+            </a:r>
+            <a:r>
               <a:rPr lang="en" sz="3000" b="0" dirty="0"/>
-              <a:t> for more detail.</a:t>
+              <a:t>for more detail.</a:t>
             </a:r>
             <a:endParaRPr sz="3000" b="0" dirty="0"/>
           </a:p>

</xml_diff>